<commit_message>
corrigindo o slide de apresentação
</commit_message>
<xml_diff>
--- a/TesteDeAceitacao/Apresentação Gestão Pet Shop.pptx
+++ b/TesteDeAceitacao/Apresentação Gestão Pet Shop.pptx
@@ -289,7 +289,7 @@
           <a:p>
             <a:fld id="{4A9ED39B-2040-4F2F-942C-146CB5E6E328}" type="datetimeFigureOut">
               <a:rPr lang="pt-BR" smtClean="0"/>
-              <a:t>18/10/2023</a:t>
+              <a:t>22/10/2023</a:t>
             </a:fld>
             <a:endParaRPr lang="pt-BR"/>
           </a:p>
@@ -556,7 +556,7 @@
           <a:p>
             <a:fld id="{4A9ED39B-2040-4F2F-942C-146CB5E6E328}" type="datetimeFigureOut">
               <a:rPr lang="pt-BR" smtClean="0"/>
-              <a:t>18/10/2023</a:t>
+              <a:t>22/10/2023</a:t>
             </a:fld>
             <a:endParaRPr lang="pt-BR"/>
           </a:p>
@@ -787,7 +787,7 @@
           <a:p>
             <a:fld id="{4A9ED39B-2040-4F2F-942C-146CB5E6E328}" type="datetimeFigureOut">
               <a:rPr lang="pt-BR" smtClean="0"/>
-              <a:t>18/10/2023</a:t>
+              <a:t>22/10/2023</a:t>
             </a:fld>
             <a:endParaRPr lang="pt-BR"/>
           </a:p>
@@ -1097,7 +1097,7 @@
           <a:p>
             <a:fld id="{4A9ED39B-2040-4F2F-942C-146CB5E6E328}" type="datetimeFigureOut">
               <a:rPr lang="pt-BR" smtClean="0"/>
-              <a:t>18/10/2023</a:t>
+              <a:t>22/10/2023</a:t>
             </a:fld>
             <a:endParaRPr lang="pt-BR"/>
           </a:p>
@@ -1570,7 +1570,7 @@
           <a:p>
             <a:fld id="{4A9ED39B-2040-4F2F-942C-146CB5E6E328}" type="datetimeFigureOut">
               <a:rPr lang="pt-BR" smtClean="0"/>
-              <a:t>18/10/2023</a:t>
+              <a:t>22/10/2023</a:t>
             </a:fld>
             <a:endParaRPr lang="pt-BR"/>
           </a:p>
@@ -2117,7 +2117,7 @@
           <a:p>
             <a:fld id="{4A9ED39B-2040-4F2F-942C-146CB5E6E328}" type="datetimeFigureOut">
               <a:rPr lang="pt-BR" smtClean="0"/>
-              <a:t>18/10/2023</a:t>
+              <a:t>22/10/2023</a:t>
             </a:fld>
             <a:endParaRPr lang="pt-BR"/>
           </a:p>
@@ -2891,7 +2891,7 @@
           <a:p>
             <a:fld id="{4A9ED39B-2040-4F2F-942C-146CB5E6E328}" type="datetimeFigureOut">
               <a:rPr lang="pt-BR" smtClean="0"/>
-              <a:t>18/10/2023</a:t>
+              <a:t>22/10/2023</a:t>
             </a:fld>
             <a:endParaRPr lang="pt-BR"/>
           </a:p>
@@ -3066,7 +3066,7 @@
           <a:p>
             <a:fld id="{4A9ED39B-2040-4F2F-942C-146CB5E6E328}" type="datetimeFigureOut">
               <a:rPr lang="pt-BR" smtClean="0"/>
-              <a:t>18/10/2023</a:t>
+              <a:t>22/10/2023</a:t>
             </a:fld>
             <a:endParaRPr lang="pt-BR"/>
           </a:p>
@@ -3289,7 +3289,7 @@
           <a:p>
             <a:fld id="{4A9ED39B-2040-4F2F-942C-146CB5E6E328}" type="datetimeFigureOut">
               <a:rPr lang="pt-BR" smtClean="0"/>
-              <a:t>18/10/2023</a:t>
+              <a:t>22/10/2023</a:t>
             </a:fld>
             <a:endParaRPr lang="pt-BR"/>
           </a:p>
@@ -3469,7 +3469,7 @@
           <a:p>
             <a:fld id="{4A9ED39B-2040-4F2F-942C-146CB5E6E328}" type="datetimeFigureOut">
               <a:rPr lang="pt-BR" smtClean="0"/>
-              <a:t>18/10/2023</a:t>
+              <a:t>22/10/2023</a:t>
             </a:fld>
             <a:endParaRPr lang="pt-BR"/>
           </a:p>
@@ -3758,7 +3758,7 @@
           <a:p>
             <a:fld id="{4A9ED39B-2040-4F2F-942C-146CB5E6E328}" type="datetimeFigureOut">
               <a:rPr lang="pt-BR" smtClean="0"/>
-              <a:t>18/10/2023</a:t>
+              <a:t>22/10/2023</a:t>
             </a:fld>
             <a:endParaRPr lang="pt-BR"/>
           </a:p>
@@ -4000,7 +4000,7 @@
           <a:p>
             <a:fld id="{4A9ED39B-2040-4F2F-942C-146CB5E6E328}" type="datetimeFigureOut">
               <a:rPr lang="pt-BR" smtClean="0"/>
-              <a:t>18/10/2023</a:t>
+              <a:t>22/10/2023</a:t>
             </a:fld>
             <a:endParaRPr lang="pt-BR"/>
           </a:p>
@@ -4379,7 +4379,7 @@
           <a:p>
             <a:fld id="{4A9ED39B-2040-4F2F-942C-146CB5E6E328}" type="datetimeFigureOut">
               <a:rPr lang="pt-BR" smtClean="0"/>
-              <a:t>18/10/2023</a:t>
+              <a:t>22/10/2023</a:t>
             </a:fld>
             <a:endParaRPr lang="pt-BR"/>
           </a:p>
@@ -4497,7 +4497,7 @@
           <a:p>
             <a:fld id="{4A9ED39B-2040-4F2F-942C-146CB5E6E328}" type="datetimeFigureOut">
               <a:rPr lang="pt-BR" smtClean="0"/>
-              <a:t>18/10/2023</a:t>
+              <a:t>22/10/2023</a:t>
             </a:fld>
             <a:endParaRPr lang="pt-BR"/>
           </a:p>
@@ -4592,7 +4592,7 @@
           <a:p>
             <a:fld id="{4A9ED39B-2040-4F2F-942C-146CB5E6E328}" type="datetimeFigureOut">
               <a:rPr lang="pt-BR" smtClean="0"/>
-              <a:t>18/10/2023</a:t>
+              <a:t>22/10/2023</a:t>
             </a:fld>
             <a:endParaRPr lang="pt-BR"/>
           </a:p>
@@ -4841,7 +4841,7 @@
           <a:p>
             <a:fld id="{4A9ED39B-2040-4F2F-942C-146CB5E6E328}" type="datetimeFigureOut">
               <a:rPr lang="pt-BR" smtClean="0"/>
-              <a:t>18/10/2023</a:t>
+              <a:t>22/10/2023</a:t>
             </a:fld>
             <a:endParaRPr lang="pt-BR"/>
           </a:p>
@@ -5098,7 +5098,7 @@
           <a:p>
             <a:fld id="{4A9ED39B-2040-4F2F-942C-146CB5E6E328}" type="datetimeFigureOut">
               <a:rPr lang="pt-BR" smtClean="0"/>
-              <a:t>18/10/2023</a:t>
+              <a:t>22/10/2023</a:t>
             </a:fld>
             <a:endParaRPr lang="pt-BR"/>
           </a:p>
@@ -5341,7 +5341,7 @@
           <a:p>
             <a:fld id="{4A9ED39B-2040-4F2F-942C-146CB5E6E328}" type="datetimeFigureOut">
               <a:rPr lang="pt-BR" smtClean="0"/>
-              <a:t>18/10/2023</a:t>
+              <a:t>22/10/2023</a:t>
             </a:fld>
             <a:endParaRPr lang="pt-BR"/>
           </a:p>
@@ -7616,7 +7616,7 @@
         <p:spPr>
           <a:xfrm>
             <a:off x="141668" y="2662296"/>
-            <a:ext cx="11887200" cy="2062103"/>
+            <a:ext cx="11887200" cy="2554545"/>
           </a:xfrm>
           <a:prstGeom prst="rect">
             <a:avLst/>
@@ -7636,7 +7636,15 @@
             </a:r>
             <a:r>
               <a:rPr lang="pt-BR" sz="3200" dirty="0"/>
-              <a:t>do exposto, optou-se por criar um Sistema que possa auxiliar as empresas no controle dos seus serviços, propiciando maior organização, simplicidade, controle e agilidade que atenda a demanda do mercado</a:t>
+              <a:t>do exposto, optou-se por criar um Sistema que possa auxiliar as empresas no controle dos seus serviços, </a:t>
+            </a:r>
+            <a:r>
+              <a:rPr lang="pt-BR" sz="3200" dirty="0" smtClean="0"/>
+              <a:t>proporcionando </a:t>
+            </a:r>
+            <a:r>
+              <a:rPr lang="pt-BR" sz="3200" dirty="0"/>
+              <a:t>maior organização, simplicidade, controle e agilidade que atenda a demanda do mercado</a:t>
             </a:r>
             <a:r>
               <a:rPr lang="pt-BR" sz="3200" dirty="0" smtClean="0"/>
@@ -8006,7 +8014,11 @@
             </a:r>
             <a:r>
               <a:rPr lang="pt-BR" sz="3200" dirty="0"/>
-              <a:t>será disponibilizado o sistema de </a:t>
+              <a:t>será disponibilizado o sistema </a:t>
+            </a:r>
+            <a:r>
+              <a:rPr lang="pt-BR" sz="3200" dirty="0" smtClean="0"/>
+              <a:t>em Desktop para </a:t>
             </a:r>
             <a:r>
               <a:rPr lang="pt-BR" sz="3200" dirty="0" smtClean="0"/>
@@ -8037,20 +8049,12 @@
               <a:t>clientes</a:t>
             </a:r>
             <a:r>
-              <a:rPr lang="pt-BR" sz="3200" dirty="0"/>
+              <a:rPr lang="pt-BR" sz="3200"/>
               <a:t>, </a:t>
             </a:r>
             <a:r>
-              <a:rPr lang="pt-BR" sz="3200" dirty="0" smtClean="0"/>
-              <a:t>animais</a:t>
-            </a:r>
-            <a:r>
-              <a:rPr lang="pt-BR" sz="3200" dirty="0"/>
-              <a:t>, </a:t>
-            </a:r>
-            <a:r>
-              <a:rPr lang="pt-BR" sz="3200" dirty="0" smtClean="0"/>
-              <a:t>serviços, agendamento </a:t>
+              <a:rPr lang="pt-BR" sz="3200" smtClean="0"/>
+              <a:t>animais, agendamento </a:t>
             </a:r>
             <a:r>
               <a:rPr lang="pt-BR" sz="3200" dirty="0"/>
@@ -8724,11 +8728,7 @@
             </a:r>
             <a:r>
               <a:rPr lang="pt-BR" sz="3200" dirty="0" smtClean="0"/>
-              <a:t>fácil </a:t>
-            </a:r>
-            <a:r>
-              <a:rPr lang="pt-BR" sz="3200" dirty="0" smtClean="0"/>
-              <a:t>de manusear, </a:t>
+              <a:t>fácil de manusear, </a:t>
             </a:r>
             <a:r>
               <a:rPr lang="pt-BR" sz="3200" dirty="0"/>
@@ -8736,15 +8736,7 @@
             </a:r>
             <a:r>
               <a:rPr lang="pt-BR" sz="3200" dirty="0" smtClean="0"/>
-              <a:t>adaptar</a:t>
-            </a:r>
-            <a:r>
-              <a:rPr lang="pt-BR" sz="3200" dirty="0" smtClean="0"/>
-              <a:t> </a:t>
-            </a:r>
-            <a:r>
-              <a:rPr lang="pt-BR" sz="3200" dirty="0" smtClean="0"/>
-              <a:t>facilmente.</a:t>
+              <a:t>adaptar facilmente.</a:t>
             </a:r>
             <a:endParaRPr lang="pt-BR" sz="3200" dirty="0"/>
           </a:p>
@@ -9091,11 +9083,7 @@
             <a:pPr algn="ctr"/>
             <a:r>
               <a:rPr lang="pt-BR" sz="4800" dirty="0" smtClean="0"/>
-              <a:t>	</a:t>
-            </a:r>
-            <a:r>
-              <a:rPr lang="pt-BR" sz="4800" dirty="0" smtClean="0"/>
-              <a:t>Vamos conhecer um pouco do sistema!</a:t>
+              <a:t>	Vamos conhecer um pouco do sistema!</a:t>
             </a:r>
             <a:endParaRPr lang="pt-BR" sz="4800" dirty="0"/>
           </a:p>
@@ -9329,7 +9317,6 @@
               <a:rPr lang="pt-BR" sz="3200" dirty="0" smtClean="0"/>
               <a:t>desenvolvimento.</a:t>
             </a:r>
-            <a:endParaRPr lang="pt-BR" sz="3200" dirty="0" smtClean="0"/>
           </a:p>
           <a:p>
             <a:pPr algn="just"/>

</xml_diff>